<commit_message>
* Initial commit of build script and scenario files * Adjusting Handouts * Changed to using the stop() method in scenarios so we can use the Run-Button instead of Act-Button
</commit_message>
<xml_diff>
--- a/handouts/handout-05-chapter-2-program-flow-diagrams.pptx
+++ b/handouts/handout-05-chapter-2-program-flow-diagrams.pptx
@@ -8,8 +8,8 @@
     <p:sldId id="257" r:id="rId2"/>
     <p:sldId id="258" r:id="rId3"/>
     <p:sldId id="259" r:id="rId4"/>
-    <p:sldId id="260" r:id="rId5"/>
-    <p:sldId id="261" r:id="rId6"/>
+    <p:sldId id="261" r:id="rId5"/>
+    <p:sldId id="260" r:id="rId6"/>
     <p:sldId id="262" r:id="rId7"/>
     <p:sldId id="263" r:id="rId8"/>
   </p:sldIdLst>
@@ -294,7 +294,7 @@
           <a:p>
             <a:fld id="{6964CE5B-6E3C-46A7-B73D-6570DDE6CB2E}" type="datetimeFigureOut">
               <a:rPr lang="de-CH" smtClean="0"/>
-              <a:t>12.07.2012</a:t>
+              <a:t>10.09.2012</a:t>
             </a:fld>
             <a:endParaRPr lang="de-CH"/>
           </a:p>
@@ -464,7 +464,7 @@
           <a:p>
             <a:fld id="{6964CE5B-6E3C-46A7-B73D-6570DDE6CB2E}" type="datetimeFigureOut">
               <a:rPr lang="de-CH" smtClean="0"/>
-              <a:t>12.07.2012</a:t>
+              <a:t>10.09.2012</a:t>
             </a:fld>
             <a:endParaRPr lang="de-CH"/>
           </a:p>
@@ -644,7 +644,7 @@
           <a:p>
             <a:fld id="{6964CE5B-6E3C-46A7-B73D-6570DDE6CB2E}" type="datetimeFigureOut">
               <a:rPr lang="de-CH" smtClean="0"/>
-              <a:t>12.07.2012</a:t>
+              <a:t>10.09.2012</a:t>
             </a:fld>
             <a:endParaRPr lang="de-CH"/>
           </a:p>
@@ -814,7 +814,7 @@
           <a:p>
             <a:fld id="{6964CE5B-6E3C-46A7-B73D-6570DDE6CB2E}" type="datetimeFigureOut">
               <a:rPr lang="de-CH" smtClean="0"/>
-              <a:t>12.07.2012</a:t>
+              <a:t>10.09.2012</a:t>
             </a:fld>
             <a:endParaRPr lang="de-CH"/>
           </a:p>
@@ -1060,7 +1060,7 @@
           <a:p>
             <a:fld id="{6964CE5B-6E3C-46A7-B73D-6570DDE6CB2E}" type="datetimeFigureOut">
               <a:rPr lang="de-CH" smtClean="0"/>
-              <a:t>12.07.2012</a:t>
+              <a:t>10.09.2012</a:t>
             </a:fld>
             <a:endParaRPr lang="de-CH"/>
           </a:p>
@@ -1348,7 +1348,7 @@
           <a:p>
             <a:fld id="{6964CE5B-6E3C-46A7-B73D-6570DDE6CB2E}" type="datetimeFigureOut">
               <a:rPr lang="de-CH" smtClean="0"/>
-              <a:t>12.07.2012</a:t>
+              <a:t>10.09.2012</a:t>
             </a:fld>
             <a:endParaRPr lang="de-CH"/>
           </a:p>
@@ -1770,7 +1770,7 @@
           <a:p>
             <a:fld id="{6964CE5B-6E3C-46A7-B73D-6570DDE6CB2E}" type="datetimeFigureOut">
               <a:rPr lang="de-CH" smtClean="0"/>
-              <a:t>12.07.2012</a:t>
+              <a:t>10.09.2012</a:t>
             </a:fld>
             <a:endParaRPr lang="de-CH"/>
           </a:p>
@@ -1888,7 +1888,7 @@
           <a:p>
             <a:fld id="{6964CE5B-6E3C-46A7-B73D-6570DDE6CB2E}" type="datetimeFigureOut">
               <a:rPr lang="de-CH" smtClean="0"/>
-              <a:t>12.07.2012</a:t>
+              <a:t>10.09.2012</a:t>
             </a:fld>
             <a:endParaRPr lang="de-CH"/>
           </a:p>
@@ -1983,7 +1983,7 @@
           <a:p>
             <a:fld id="{6964CE5B-6E3C-46A7-B73D-6570DDE6CB2E}" type="datetimeFigureOut">
               <a:rPr lang="de-CH" smtClean="0"/>
-              <a:t>12.07.2012</a:t>
+              <a:t>10.09.2012</a:t>
             </a:fld>
             <a:endParaRPr lang="de-CH"/>
           </a:p>
@@ -2260,7 +2260,7 @@
           <a:p>
             <a:fld id="{6964CE5B-6E3C-46A7-B73D-6570DDE6CB2E}" type="datetimeFigureOut">
               <a:rPr lang="de-CH" smtClean="0"/>
-              <a:t>12.07.2012</a:t>
+              <a:t>10.09.2012</a:t>
             </a:fld>
             <a:endParaRPr lang="de-CH"/>
           </a:p>
@@ -2513,7 +2513,7 @@
           <a:p>
             <a:fld id="{6964CE5B-6E3C-46A7-B73D-6570DDE6CB2E}" type="datetimeFigureOut">
               <a:rPr lang="de-CH" smtClean="0"/>
-              <a:t>12.07.2012</a:t>
+              <a:t>10.09.2012</a:t>
             </a:fld>
             <a:endParaRPr lang="de-CH"/>
           </a:p>
@@ -2726,7 +2726,7 @@
           <a:p>
             <a:fld id="{6964CE5B-6E3C-46A7-B73D-6570DDE6CB2E}" type="datetimeFigureOut">
               <a:rPr lang="de-CH" smtClean="0"/>
-              <a:t>12.07.2012</a:t>
+              <a:t>10.09.2012</a:t>
             </a:fld>
             <a:endParaRPr lang="de-CH"/>
           </a:p>
@@ -3103,16 +3103,16 @@
       </p:grpSpPr>
       <p:grpSp>
         <p:nvGrpSpPr>
-          <p:cNvPr id="40" name="Gruppieren 39"/>
+          <p:cNvPr id="17" name="Gruppieren 16"/>
           <p:cNvGrpSpPr/>
           <p:nvPr/>
         </p:nvGrpSpPr>
         <p:grpSpPr>
           <a:xfrm>
-            <a:off x="1146582" y="1351279"/>
-            <a:ext cx="5214620" cy="3183255"/>
-            <a:chOff x="1146582" y="1351279"/>
-            <a:chExt cx="5214620" cy="3183255"/>
+            <a:off x="1146582" y="1125556"/>
+            <a:ext cx="5441642" cy="3415328"/>
+            <a:chOff x="1146582" y="1125556"/>
+            <a:chExt cx="5441642" cy="3415328"/>
           </a:xfrm>
         </p:grpSpPr>
         <p:sp>
@@ -3158,7 +3158,7 @@
                 </a:spcAft>
               </a:pPr>
               <a:r>
-                <a:rPr lang="de-CH" sz="1100" kern="1200">
+                <a:rPr lang="de-CH" sz="1100" kern="1200" dirty="0" err="1" smtClean="0">
                   <a:solidFill>
                     <a:srgbClr val="000000"/>
                   </a:solidFill>
@@ -3166,9 +3166,20 @@
                   <a:ea typeface="Times New Roman"/>
                   <a:cs typeface="Times New Roman"/>
                 </a:rPr>
-                <a:t>Start</a:t>
-              </a:r>
-              <a:endParaRPr lang="de-CH" sz="1200">
+                <a:t>act</a:t>
+              </a:r>
+              <a:r>
+                <a:rPr lang="de-CH" sz="1100" kern="1200" dirty="0" smtClean="0">
+                  <a:solidFill>
+                    <a:srgbClr val="000000"/>
+                  </a:solidFill>
+                  <a:effectLst/>
+                  <a:ea typeface="Times New Roman"/>
+                  <a:cs typeface="Times New Roman"/>
+                </a:rPr>
+                <a:t>()-Start</a:t>
+              </a:r>
+              <a:endParaRPr lang="de-CH" sz="1200" dirty="0">
                 <a:effectLst/>
                 <a:latin typeface="Times New Roman"/>
                 <a:ea typeface="Times New Roman"/>
@@ -3648,7 +3659,18 @@
                   <a:ea typeface="Times New Roman"/>
                   <a:cs typeface="Times New Roman"/>
                 </a:rPr>
-                <a:t>Stop</a:t>
+                <a:t>act</a:t>
+              </a:r>
+              <a:r>
+                <a:rPr lang="de-CH" sz="1100" kern="1200" dirty="0" smtClean="0">
+                  <a:solidFill>
+                    <a:srgbClr val="000000"/>
+                  </a:solidFill>
+                  <a:effectLst/>
+                  <a:ea typeface="Times New Roman"/>
+                  <a:cs typeface="Times New Roman"/>
+                </a:rPr>
+                <a:t>()-End</a:t>
               </a:r>
               <a:endParaRPr lang="de-CH" sz="1100" dirty="0">
                 <a:effectLst/>
@@ -3732,6 +3754,94 @@
             </a:fontRef>
           </p:style>
         </p:cxnSp>
+        <p:cxnSp>
+          <p:nvCxnSpPr>
+            <p:cNvPr id="15" name="Gewinkelte Verbindung 14"/>
+            <p:cNvCxnSpPr>
+              <a:stCxn id="11" idx="2"/>
+              <a:endCxn id="2" idx="0"/>
+            </p:cNvCxnSpPr>
+            <p:nvPr/>
+          </p:nvCxnSpPr>
+          <p:spPr>
+            <a:xfrm rot="5400000" flipH="1">
+              <a:off x="2163013" y="2942907"/>
+              <a:ext cx="3183255" cy="12700"/>
+            </a:xfrm>
+            <a:prstGeom prst="bentConnector5">
+              <a:avLst>
+                <a:gd name="adj1" fmla="val -7181"/>
+                <a:gd name="adj2" fmla="val -22454953"/>
+                <a:gd name="adj3" fmla="val 107181"/>
+              </a:avLst>
+            </a:prstGeom>
+            <a:ln w="28575">
+              <a:prstDash val="sysDash"/>
+              <a:tailEnd type="arrow"/>
+            </a:ln>
+          </p:spPr>
+          <p:style>
+            <a:lnRef idx="1">
+              <a:schemeClr val="dk1"/>
+            </a:lnRef>
+            <a:fillRef idx="0">
+              <a:schemeClr val="dk1"/>
+            </a:fillRef>
+            <a:effectRef idx="0">
+              <a:schemeClr val="dk1"/>
+            </a:effectRef>
+            <a:fontRef idx="minor">
+              <a:schemeClr val="tx1"/>
+            </a:fontRef>
+          </p:style>
+        </p:cxnSp>
+        <p:sp>
+          <p:nvSpPr>
+            <p:cNvPr id="20" name="Textfeld 365"/>
+            <p:cNvSpPr txBox="1"/>
+            <p:nvPr/>
+          </p:nvSpPr>
+          <p:spPr>
+            <a:xfrm>
+              <a:off x="4820692" y="1125556"/>
+              <a:ext cx="1767532" cy="334010"/>
+            </a:xfrm>
+            <a:prstGeom prst="rect">
+              <a:avLst/>
+            </a:prstGeom>
+            <a:noFill/>
+          </p:spPr>
+          <p:txBody>
+            <a:bodyPr wrap="square" rtlCol="0">
+              <a:noAutofit/>
+            </a:bodyPr>
+            <a:lstStyle/>
+            <a:p>
+              <a:pPr algn="r">
+                <a:spcAft>
+                  <a:spcPts val="0"/>
+                </a:spcAft>
+              </a:pPr>
+              <a:r>
+                <a:rPr lang="de-CH" sz="1200" i="1" kern="1200" dirty="0" smtClean="0">
+                  <a:solidFill>
+                    <a:srgbClr val="000000"/>
+                  </a:solidFill>
+                  <a:effectLst/>
+                  <a:latin typeface="Calibri"/>
+                  <a:ea typeface="Times New Roman"/>
+                  <a:cs typeface="Times New Roman"/>
+                </a:rPr>
+                <a:t>Run-Cycle</a:t>
+              </a:r>
+              <a:endParaRPr lang="de-CH" sz="1400" i="1" dirty="0">
+                <a:effectLst/>
+                <a:latin typeface="Times New Roman"/>
+                <a:ea typeface="Times New Roman"/>
+              </a:endParaRPr>
+            </a:p>
+          </p:txBody>
+        </p:sp>
       </p:grpSp>
     </p:spTree>
     <p:extLst>
@@ -3765,16 +3875,16 @@
       </p:grpSpPr>
       <p:grpSp>
         <p:nvGrpSpPr>
-          <p:cNvPr id="31" name="Gruppieren 30"/>
+          <p:cNvPr id="37" name="Gruppieren 36"/>
           <p:cNvGrpSpPr/>
           <p:nvPr/>
         </p:nvGrpSpPr>
         <p:grpSpPr>
           <a:xfrm>
-            <a:off x="1146582" y="1027111"/>
-            <a:ext cx="5214620" cy="5215890"/>
-            <a:chOff x="1146582" y="1027111"/>
-            <a:chExt cx="5214620" cy="5215890"/>
+            <a:off x="1146582" y="791546"/>
+            <a:ext cx="5412546" cy="5451456"/>
+            <a:chOff x="1146582" y="791546"/>
+            <a:chExt cx="5412546" cy="5451456"/>
           </a:xfrm>
         </p:grpSpPr>
         <p:sp>
@@ -3820,7 +3930,7 @@
                 </a:spcAft>
               </a:pPr>
               <a:r>
-                <a:rPr lang="de-CH" sz="1100" kern="1200">
+                <a:rPr lang="de-CH" sz="1100" kern="1200" dirty="0" err="1" smtClean="0">
                   <a:solidFill>
                     <a:srgbClr val="FF0000"/>
                   </a:solidFill>
@@ -3828,9 +3938,20 @@
                   <a:ea typeface="Times New Roman"/>
                   <a:cs typeface="Times New Roman"/>
                 </a:rPr>
-                <a:t>Start</a:t>
-              </a:r>
-              <a:endParaRPr lang="de-CH" sz="1200">
+                <a:t>act</a:t>
+              </a:r>
+              <a:r>
+                <a:rPr lang="de-CH" sz="1100" kern="1200" dirty="0" smtClean="0">
+                  <a:solidFill>
+                    <a:srgbClr val="FF0000"/>
+                  </a:solidFill>
+                  <a:effectLst/>
+                  <a:ea typeface="Times New Roman"/>
+                  <a:cs typeface="Times New Roman"/>
+                </a:rPr>
+                <a:t>()-Start</a:t>
+              </a:r>
+              <a:endParaRPr lang="de-CH" sz="1200" dirty="0">
                 <a:solidFill>
                   <a:srgbClr val="FF0000"/>
                 </a:solidFill>
@@ -4581,15 +4702,12 @@
             <p:nvPr/>
           </p:nvCxnSpPr>
           <p:spPr>
-            <a:xfrm flipH="1">
-              <a:off x="3754641" y="4146231"/>
-              <a:ext cx="1066051" cy="1705610"/>
-            </a:xfrm>
-            <a:prstGeom prst="bentConnector4">
-              <a:avLst>
-                <a:gd name="adj1" fmla="val -33953"/>
-                <a:gd name="adj2" fmla="val 84717"/>
-              </a:avLst>
+            <a:xfrm>
+              <a:off x="4820692" y="4146231"/>
+              <a:ext cx="370924" cy="1705610"/>
+            </a:xfrm>
+            <a:prstGeom prst="bentConnector2">
+              <a:avLst/>
             </a:prstGeom>
             <a:ln w="28575">
               <a:tailEnd type="arrow"/>
@@ -4672,7 +4790,7 @@
           </p:nvSpPr>
           <p:spPr>
             <a:xfrm>
-              <a:off x="3150121" y="5851841"/>
+              <a:off x="4587096" y="5851841"/>
               <a:ext cx="1209040" cy="391160"/>
             </a:xfrm>
             <a:prstGeom prst="roundRect">
@@ -4718,7 +4836,18 @@
                   <a:ea typeface="Times New Roman"/>
                   <a:cs typeface="Times New Roman"/>
                 </a:rPr>
-                <a:t>Stop</a:t>
+                <a:t>act</a:t>
+              </a:r>
+              <a:r>
+                <a:rPr lang="de-CH" sz="1100" kern="1200" dirty="0" smtClean="0">
+                  <a:solidFill>
+                    <a:srgbClr val="FF0000"/>
+                  </a:solidFill>
+                  <a:effectLst/>
+                  <a:ea typeface="Times New Roman"/>
+                  <a:cs typeface="Times New Roman"/>
+                </a:rPr>
+                <a:t>()-End</a:t>
               </a:r>
               <a:endParaRPr lang="de-CH" sz="1100" dirty="0">
                 <a:solidFill>
@@ -4736,14 +4865,14 @@
             <p:cNvPr id="26" name="Gewinkelte Verbindung 25"/>
             <p:cNvCxnSpPr>
               <a:stCxn id="20" idx="2"/>
-              <a:endCxn id="24" idx="0"/>
+              <a:endCxn id="29" idx="0"/>
             </p:cNvCxnSpPr>
             <p:nvPr/>
           </p:nvCxnSpPr>
           <p:spPr>
-            <a:xfrm rot="16200000" flipH="1">
-              <a:off x="2778589" y="4875788"/>
-              <a:ext cx="518795" cy="1433309"/>
+            <a:xfrm rot="5400000">
+              <a:off x="2063459" y="5590919"/>
+              <a:ext cx="515746" cy="1"/>
             </a:xfrm>
             <a:prstGeom prst="bentConnector3">
               <a:avLst>
@@ -4769,6 +4898,161 @@
             </a:fontRef>
           </p:style>
         </p:cxnSp>
+        <p:sp>
+          <p:nvSpPr>
+            <p:cNvPr id="29" name="Abgerundetes Rechteck 28"/>
+            <p:cNvSpPr/>
+            <p:nvPr/>
+          </p:nvSpPr>
+          <p:spPr>
+            <a:xfrm>
+              <a:off x="1716811" y="5848792"/>
+              <a:ext cx="1209040" cy="391160"/>
+            </a:xfrm>
+            <a:prstGeom prst="roundRect">
+              <a:avLst>
+                <a:gd name="adj" fmla="val 45238"/>
+              </a:avLst>
+            </a:prstGeom>
+          </p:spPr>
+          <p:style>
+            <a:lnRef idx="2">
+              <a:schemeClr val="dk1"/>
+            </a:lnRef>
+            <a:fillRef idx="1">
+              <a:schemeClr val="lt1"/>
+            </a:fillRef>
+            <a:effectRef idx="0">
+              <a:schemeClr val="dk1"/>
+            </a:effectRef>
+            <a:fontRef idx="minor">
+              <a:schemeClr val="dk1"/>
+            </a:fontRef>
+          </p:style>
+          <p:txBody>
+            <a:bodyPr wrap="square" rtlCol="0" anchor="ctr">
+              <a:noAutofit/>
+            </a:bodyPr>
+            <a:lstStyle/>
+            <a:p>
+              <a:pPr algn="ctr">
+                <a:lnSpc>
+                  <a:spcPct val="120000"/>
+                </a:lnSpc>
+                <a:spcAft>
+                  <a:spcPts val="0"/>
+                </a:spcAft>
+              </a:pPr>
+              <a:r>
+                <a:rPr lang="de-CH" sz="1100" kern="1200" dirty="0" err="1" smtClean="0">
+                  <a:solidFill>
+                    <a:srgbClr val="FF0000"/>
+                  </a:solidFill>
+                  <a:effectLst/>
+                  <a:ea typeface="Times New Roman"/>
+                  <a:cs typeface="Times New Roman"/>
+                </a:rPr>
+                <a:t>Stop</a:t>
+              </a:r>
+              <a:endParaRPr lang="de-CH" sz="1100" dirty="0">
+                <a:solidFill>
+                  <a:srgbClr val="FF0000"/>
+                </a:solidFill>
+                <a:effectLst/>
+                <a:ea typeface="Times New Roman"/>
+                <a:cs typeface="Times New Roman"/>
+              </a:endParaRPr>
+            </a:p>
+          </p:txBody>
+        </p:sp>
+        <p:cxnSp>
+          <p:nvCxnSpPr>
+            <p:cNvPr id="30" name="Gewinkelte Verbindung 29"/>
+            <p:cNvCxnSpPr>
+              <a:stCxn id="24" idx="2"/>
+              <a:endCxn id="2" idx="0"/>
+            </p:cNvCxnSpPr>
+            <p:nvPr/>
+          </p:nvCxnSpPr>
+          <p:spPr>
+            <a:xfrm rot="5400000" flipH="1">
+              <a:off x="1865184" y="2916569"/>
+              <a:ext cx="5215890" cy="1436975"/>
+            </a:xfrm>
+            <a:prstGeom prst="bentConnector5">
+              <a:avLst>
+                <a:gd name="adj1" fmla="val -4383"/>
+                <a:gd name="adj2" fmla="val -97212"/>
+                <a:gd name="adj3" fmla="val 104383"/>
+              </a:avLst>
+            </a:prstGeom>
+            <a:ln w="28575">
+              <a:prstDash val="sysDash"/>
+              <a:tailEnd type="arrow"/>
+            </a:ln>
+          </p:spPr>
+          <p:style>
+            <a:lnRef idx="1">
+              <a:schemeClr val="dk1"/>
+            </a:lnRef>
+            <a:fillRef idx="0">
+              <a:schemeClr val="dk1"/>
+            </a:fillRef>
+            <a:effectRef idx="0">
+              <a:schemeClr val="dk1"/>
+            </a:effectRef>
+            <a:fontRef idx="minor">
+              <a:schemeClr val="tx1"/>
+            </a:fontRef>
+          </p:style>
+        </p:cxnSp>
+        <p:sp>
+          <p:nvSpPr>
+            <p:cNvPr id="35" name="Textfeld 365"/>
+            <p:cNvSpPr txBox="1"/>
+            <p:nvPr/>
+          </p:nvSpPr>
+          <p:spPr>
+            <a:xfrm>
+              <a:off x="4791596" y="791546"/>
+              <a:ext cx="1767532" cy="334010"/>
+            </a:xfrm>
+            <a:prstGeom prst="rect">
+              <a:avLst/>
+            </a:prstGeom>
+            <a:noFill/>
+          </p:spPr>
+          <p:txBody>
+            <a:bodyPr wrap="square" rtlCol="0">
+              <a:noAutofit/>
+            </a:bodyPr>
+            <a:lstStyle/>
+            <a:p>
+              <a:pPr algn="r">
+                <a:spcAft>
+                  <a:spcPts val="0"/>
+                </a:spcAft>
+              </a:pPr>
+              <a:r>
+                <a:rPr lang="de-CH" sz="1200" i="1" kern="1200" dirty="0" smtClean="0">
+                  <a:solidFill>
+                    <a:srgbClr val="000000"/>
+                  </a:solidFill>
+                  <a:effectLst/>
+                  <a:latin typeface="Calibri"/>
+                  <a:ea typeface="Times New Roman"/>
+                  <a:cs typeface="Times New Roman"/>
+                </a:rPr>
+                <a:t>Run-Cycle</a:t>
+              </a:r>
+              <a:endParaRPr lang="de-CH" sz="1400" i="1" dirty="0">
+                <a:effectLst/>
+                <a:latin typeface="Times New Roman"/>
+                <a:ea typeface="Times New Roman"/>
+              </a:endParaRPr>
+            </a:p>
+          </p:txBody>
+        </p:sp>
       </p:grpSp>
     </p:spTree>
     <p:extLst>
@@ -4802,16 +5086,16 @@
       </p:grpSpPr>
       <p:grpSp>
         <p:nvGrpSpPr>
-          <p:cNvPr id="34" name="Gruppieren 33"/>
+          <p:cNvPr id="14" name="Gruppieren 13"/>
           <p:cNvGrpSpPr/>
           <p:nvPr/>
         </p:nvGrpSpPr>
         <p:grpSpPr>
           <a:xfrm>
-            <a:off x="1146582" y="1124744"/>
-            <a:ext cx="5214620" cy="3946529"/>
-            <a:chOff x="1146582" y="1124744"/>
-            <a:chExt cx="5214620" cy="3946529"/>
+            <a:off x="1146582" y="895072"/>
+            <a:ext cx="5412546" cy="4176201"/>
+            <a:chOff x="1146582" y="895072"/>
+            <a:chExt cx="5412546" cy="4176201"/>
           </a:xfrm>
         </p:grpSpPr>
         <p:sp>
@@ -4857,7 +5141,7 @@
                 </a:spcAft>
               </a:pPr>
               <a:r>
-                <a:rPr lang="de-CH" sz="1100" kern="1200">
+                <a:rPr lang="de-CH" sz="1100" kern="1200" dirty="0" err="1" smtClean="0">
                   <a:solidFill>
                     <a:srgbClr val="FF0000"/>
                   </a:solidFill>
@@ -4865,9 +5149,20 @@
                   <a:ea typeface="Times New Roman"/>
                   <a:cs typeface="Times New Roman"/>
                 </a:rPr>
-                <a:t>Start</a:t>
-              </a:r>
-              <a:endParaRPr lang="de-CH" sz="1200">
+                <a:t>act</a:t>
+              </a:r>
+              <a:r>
+                <a:rPr lang="de-CH" sz="1100" kern="1200" dirty="0" smtClean="0">
+                  <a:solidFill>
+                    <a:srgbClr val="FF0000"/>
+                  </a:solidFill>
+                  <a:effectLst/>
+                  <a:ea typeface="Times New Roman"/>
+                  <a:cs typeface="Times New Roman"/>
+                </a:rPr>
+                <a:t>()-Start</a:t>
+              </a:r>
+              <a:endParaRPr lang="de-CH" sz="1200" dirty="0">
                 <a:solidFill>
                   <a:srgbClr val="FF0000"/>
                 </a:solidFill>
@@ -5510,7 +5805,18 @@
                   <a:ea typeface="Times New Roman"/>
                   <a:cs typeface="Times New Roman"/>
                 </a:rPr>
-                <a:t>Stop</a:t>
+                <a:t>act</a:t>
+              </a:r>
+              <a:r>
+                <a:rPr lang="de-CH" sz="1100" kern="1200" dirty="0" smtClean="0">
+                  <a:solidFill>
+                    <a:srgbClr val="FF0000"/>
+                  </a:solidFill>
+                  <a:effectLst/>
+                  <a:ea typeface="Times New Roman"/>
+                  <a:cs typeface="Times New Roman"/>
+                </a:rPr>
+                <a:t>()-End</a:t>
               </a:r>
               <a:endParaRPr lang="de-CH" sz="1100" dirty="0">
                 <a:solidFill>
@@ -5561,6 +5867,94 @@
             </a:fontRef>
           </p:style>
         </p:cxnSp>
+        <p:cxnSp>
+          <p:nvCxnSpPr>
+            <p:cNvPr id="17" name="Gewinkelte Verbindung 16"/>
+            <p:cNvCxnSpPr>
+              <a:stCxn id="24" idx="2"/>
+              <a:endCxn id="2" idx="0"/>
+            </p:cNvCxnSpPr>
+            <p:nvPr/>
+          </p:nvCxnSpPr>
+          <p:spPr>
+            <a:xfrm rot="5400000" flipH="1" flipV="1">
+              <a:off x="1781001" y="3097634"/>
+              <a:ext cx="3946529" cy="749"/>
+            </a:xfrm>
+            <a:prstGeom prst="bentConnector5">
+              <a:avLst>
+                <a:gd name="adj1" fmla="val -5792"/>
+                <a:gd name="adj2" fmla="val 375539920"/>
+                <a:gd name="adj3" fmla="val 105792"/>
+              </a:avLst>
+            </a:prstGeom>
+            <a:ln w="28575">
+              <a:prstDash val="sysDash"/>
+              <a:tailEnd type="arrow"/>
+            </a:ln>
+          </p:spPr>
+          <p:style>
+            <a:lnRef idx="1">
+              <a:schemeClr val="dk1"/>
+            </a:lnRef>
+            <a:fillRef idx="0">
+              <a:schemeClr val="dk1"/>
+            </a:fillRef>
+            <a:effectRef idx="0">
+              <a:schemeClr val="dk1"/>
+            </a:effectRef>
+            <a:fontRef idx="minor">
+              <a:schemeClr val="tx1"/>
+            </a:fontRef>
+          </p:style>
+        </p:cxnSp>
+        <p:sp>
+          <p:nvSpPr>
+            <p:cNvPr id="21" name="Textfeld 365"/>
+            <p:cNvSpPr txBox="1"/>
+            <p:nvPr/>
+          </p:nvSpPr>
+          <p:spPr>
+            <a:xfrm>
+              <a:off x="4791596" y="895072"/>
+              <a:ext cx="1767532" cy="334010"/>
+            </a:xfrm>
+            <a:prstGeom prst="rect">
+              <a:avLst/>
+            </a:prstGeom>
+            <a:noFill/>
+          </p:spPr>
+          <p:txBody>
+            <a:bodyPr wrap="square" rtlCol="0">
+              <a:noAutofit/>
+            </a:bodyPr>
+            <a:lstStyle/>
+            <a:p>
+              <a:pPr algn="r">
+                <a:spcAft>
+                  <a:spcPts val="0"/>
+                </a:spcAft>
+              </a:pPr>
+              <a:r>
+                <a:rPr lang="de-CH" sz="1200" i="1" kern="1200" dirty="0" smtClean="0">
+                  <a:solidFill>
+                    <a:srgbClr val="000000"/>
+                  </a:solidFill>
+                  <a:effectLst/>
+                  <a:latin typeface="Calibri"/>
+                  <a:ea typeface="Times New Roman"/>
+                  <a:cs typeface="Times New Roman"/>
+                </a:rPr>
+                <a:t>Run-Cycle</a:t>
+              </a:r>
+              <a:endParaRPr lang="de-CH" sz="1400" i="1" dirty="0">
+                <a:effectLst/>
+                <a:latin typeface="Times New Roman"/>
+                <a:ea typeface="Times New Roman"/>
+              </a:endParaRPr>
+            </a:p>
+          </p:txBody>
+        </p:sp>
       </p:grpSp>
     </p:spTree>
     <p:extLst>
@@ -5576,6 +5970,691 @@
 </file>
 
 <file path=ppt/slides/slide4.xml><?xml version="1.0" encoding="utf-8"?>
+<p:sld xmlns:a="http://schemas.openxmlformats.org/drawingml/2006/main" xmlns:r="http://schemas.openxmlformats.org/officeDocument/2006/relationships" xmlns:p="http://schemas.openxmlformats.org/presentationml/2006/main">
+  <p:cSld>
+    <p:spTree>
+      <p:nvGrpSpPr>
+        <p:cNvPr id="1" name=""/>
+        <p:cNvGrpSpPr/>
+        <p:nvPr/>
+      </p:nvGrpSpPr>
+      <p:grpSpPr>
+        <a:xfrm>
+          <a:off x="0" y="0"/>
+          <a:ext cx="0" cy="0"/>
+          <a:chOff x="0" y="0"/>
+          <a:chExt cx="0" cy="0"/>
+        </a:xfrm>
+      </p:grpSpPr>
+      <p:grpSp>
+        <p:nvGrpSpPr>
+          <p:cNvPr id="17" name="Gruppieren 16"/>
+          <p:cNvGrpSpPr/>
+          <p:nvPr/>
+        </p:nvGrpSpPr>
+        <p:grpSpPr>
+          <a:xfrm>
+            <a:off x="1146582" y="895072"/>
+            <a:ext cx="4544878" cy="3347359"/>
+            <a:chOff x="1146582" y="895072"/>
+            <a:chExt cx="4544878" cy="3347359"/>
+          </a:xfrm>
+        </p:grpSpPr>
+        <p:sp>
+          <p:nvSpPr>
+            <p:cNvPr id="2" name="Abgerundetes Rechteck 1"/>
+            <p:cNvSpPr/>
+            <p:nvPr/>
+          </p:nvSpPr>
+          <p:spPr>
+            <a:xfrm>
+              <a:off x="3150121" y="1124744"/>
+              <a:ext cx="1209040" cy="391160"/>
+            </a:xfrm>
+            <a:prstGeom prst="roundRect">
+              <a:avLst>
+                <a:gd name="adj" fmla="val 45238"/>
+              </a:avLst>
+            </a:prstGeom>
+          </p:spPr>
+          <p:style>
+            <a:lnRef idx="2">
+              <a:schemeClr val="dk1"/>
+            </a:lnRef>
+            <a:fillRef idx="1">
+              <a:schemeClr val="lt1"/>
+            </a:fillRef>
+            <a:effectRef idx="0">
+              <a:schemeClr val="dk1"/>
+            </a:effectRef>
+            <a:fontRef idx="minor">
+              <a:schemeClr val="dk1"/>
+            </a:fontRef>
+          </p:style>
+          <p:txBody>
+            <a:bodyPr wrap="square" rtlCol="0" anchor="ctr">
+              <a:noAutofit/>
+            </a:bodyPr>
+            <a:lstStyle/>
+            <a:p>
+              <a:pPr algn="ctr">
+                <a:spcAft>
+                  <a:spcPts val="0"/>
+                </a:spcAft>
+              </a:pPr>
+              <a:r>
+                <a:rPr lang="de-CH" sz="1100" kern="1200" dirty="0" err="1" smtClean="0">
+                  <a:solidFill>
+                    <a:srgbClr val="FF0000"/>
+                  </a:solidFill>
+                  <a:effectLst/>
+                  <a:ea typeface="Times New Roman"/>
+                  <a:cs typeface="Times New Roman"/>
+                </a:rPr>
+                <a:t>act</a:t>
+              </a:r>
+              <a:r>
+                <a:rPr lang="de-CH" sz="1100" kern="1200" dirty="0" smtClean="0">
+                  <a:solidFill>
+                    <a:srgbClr val="FF0000"/>
+                  </a:solidFill>
+                  <a:effectLst/>
+                  <a:ea typeface="Times New Roman"/>
+                  <a:cs typeface="Times New Roman"/>
+                </a:rPr>
+                <a:t>()-Start</a:t>
+              </a:r>
+              <a:endParaRPr lang="de-CH" sz="1200" dirty="0">
+                <a:solidFill>
+                  <a:srgbClr val="FF0000"/>
+                </a:solidFill>
+                <a:effectLst/>
+                <a:latin typeface="Times New Roman"/>
+                <a:ea typeface="Times New Roman"/>
+              </a:endParaRPr>
+            </a:p>
+          </p:txBody>
+        </p:sp>
+        <p:cxnSp>
+          <p:nvCxnSpPr>
+            <p:cNvPr id="3" name="Gerade Verbindung mit Pfeil 2"/>
+            <p:cNvCxnSpPr>
+              <a:stCxn id="2" idx="2"/>
+              <a:endCxn id="4" idx="0"/>
+            </p:cNvCxnSpPr>
+            <p:nvPr/>
+          </p:nvCxnSpPr>
+          <p:spPr>
+            <a:xfrm flipH="1">
+              <a:off x="3753892" y="1515904"/>
+              <a:ext cx="749" cy="270667"/>
+            </a:xfrm>
+            <a:prstGeom prst="straightConnector1">
+              <a:avLst/>
+            </a:prstGeom>
+            <a:ln w="28575">
+              <a:tailEnd type="arrow"/>
+            </a:ln>
+          </p:spPr>
+          <p:style>
+            <a:lnRef idx="1">
+              <a:schemeClr val="dk1"/>
+            </a:lnRef>
+            <a:fillRef idx="0">
+              <a:schemeClr val="dk1"/>
+            </a:fillRef>
+            <a:effectRef idx="0">
+              <a:schemeClr val="dk1"/>
+            </a:effectRef>
+            <a:fontRef idx="minor">
+              <a:schemeClr val="tx1"/>
+            </a:fontRef>
+          </p:style>
+        </p:cxnSp>
+        <p:sp>
+          <p:nvSpPr>
+            <p:cNvPr id="4" name="Flussdiagramm: Verzweigung 3"/>
+            <p:cNvSpPr/>
+            <p:nvPr/>
+          </p:nvSpPr>
+          <p:spPr>
+            <a:xfrm>
+              <a:off x="2687092" y="1786571"/>
+              <a:ext cx="2133600" cy="654050"/>
+            </a:xfrm>
+            <a:prstGeom prst="flowChartDecision">
+              <a:avLst/>
+            </a:prstGeom>
+          </p:spPr>
+          <p:style>
+            <a:lnRef idx="2">
+              <a:schemeClr val="dk1"/>
+            </a:lnRef>
+            <a:fillRef idx="1">
+              <a:schemeClr val="lt1"/>
+            </a:fillRef>
+            <a:effectRef idx="0">
+              <a:schemeClr val="dk1"/>
+            </a:effectRef>
+            <a:fontRef idx="minor">
+              <a:schemeClr val="dk1"/>
+            </a:fontRef>
+          </p:style>
+          <p:txBody>
+            <a:bodyPr wrap="square" lIns="0" tIns="0" rIns="0" bIns="0" rtlCol="0" anchor="ctr">
+              <a:noAutofit/>
+            </a:bodyPr>
+            <a:lstStyle/>
+            <a:p>
+              <a:pPr algn="ctr">
+                <a:spcAft>
+                  <a:spcPts val="0"/>
+                </a:spcAft>
+              </a:pPr>
+              <a:r>
+                <a:rPr lang="de-CH" sz="1100" kern="1200" dirty="0" err="1" smtClean="0">
+                  <a:solidFill>
+                    <a:srgbClr val="FF0000"/>
+                  </a:solidFill>
+                  <a:effectLst/>
+                  <a:ea typeface="Times New Roman"/>
+                  <a:cs typeface="Times New Roman"/>
+                </a:rPr>
+                <a:t>onLeaf</a:t>
+              </a:r>
+              <a:r>
+                <a:rPr lang="de-CH" sz="1100" kern="1200" dirty="0" smtClean="0">
+                  <a:solidFill>
+                    <a:srgbClr val="FF0000"/>
+                  </a:solidFill>
+                  <a:effectLst/>
+                  <a:ea typeface="Times New Roman"/>
+                  <a:cs typeface="Times New Roman"/>
+                </a:rPr>
+                <a:t>()</a:t>
+              </a:r>
+              <a:endParaRPr lang="de-CH" sz="1200" dirty="0">
+                <a:solidFill>
+                  <a:srgbClr val="FF0000"/>
+                </a:solidFill>
+                <a:effectLst/>
+                <a:latin typeface="Times New Roman"/>
+                <a:ea typeface="Times New Roman"/>
+              </a:endParaRPr>
+            </a:p>
+          </p:txBody>
+        </p:sp>
+        <p:sp>
+          <p:nvSpPr>
+            <p:cNvPr id="6" name="Textfeld 365"/>
+            <p:cNvSpPr txBox="1"/>
+            <p:nvPr/>
+          </p:nvSpPr>
+          <p:spPr>
+            <a:xfrm>
+              <a:off x="4791596" y="1851776"/>
+              <a:ext cx="477520" cy="276860"/>
+            </a:xfrm>
+            <a:prstGeom prst="rect">
+              <a:avLst/>
+            </a:prstGeom>
+            <a:noFill/>
+          </p:spPr>
+          <p:txBody>
+            <a:bodyPr wrap="square" rtlCol="0">
+              <a:noAutofit/>
+            </a:bodyPr>
+            <a:lstStyle/>
+            <a:p>
+              <a:pPr>
+                <a:spcAft>
+                  <a:spcPts val="0"/>
+                </a:spcAft>
+              </a:pPr>
+              <a:r>
+                <a:rPr lang="de-CH" sz="1100" kern="1200" dirty="0" err="1" smtClean="0">
+                  <a:solidFill>
+                    <a:srgbClr val="FF0000"/>
+                  </a:solidFill>
+                  <a:effectLst/>
+                  <a:latin typeface="Calibri"/>
+                  <a:ea typeface="Times New Roman"/>
+                  <a:cs typeface="Times New Roman"/>
+                </a:rPr>
+                <a:t>no</a:t>
+              </a:r>
+              <a:endParaRPr lang="de-CH" sz="1200" dirty="0">
+                <a:solidFill>
+                  <a:srgbClr val="FF0000"/>
+                </a:solidFill>
+                <a:effectLst/>
+                <a:latin typeface="Times New Roman"/>
+                <a:ea typeface="Times New Roman"/>
+              </a:endParaRPr>
+            </a:p>
+          </p:txBody>
+        </p:sp>
+        <p:cxnSp>
+          <p:nvCxnSpPr>
+            <p:cNvPr id="7" name="Gewinkelte Verbindung 6"/>
+            <p:cNvCxnSpPr>
+              <a:stCxn id="4" idx="1"/>
+              <a:endCxn id="5" idx="0"/>
+            </p:cNvCxnSpPr>
+            <p:nvPr/>
+          </p:nvCxnSpPr>
+          <p:spPr>
+            <a:xfrm rot="10800000" flipV="1">
+              <a:off x="2321332" y="2113595"/>
+              <a:ext cx="365760" cy="648335"/>
+            </a:xfrm>
+            <a:prstGeom prst="bentConnector2">
+              <a:avLst/>
+            </a:prstGeom>
+            <a:ln w="28575">
+              <a:tailEnd type="arrow"/>
+            </a:ln>
+          </p:spPr>
+          <p:style>
+            <a:lnRef idx="1">
+              <a:schemeClr val="dk1"/>
+            </a:lnRef>
+            <a:fillRef idx="0">
+              <a:schemeClr val="dk1"/>
+            </a:fillRef>
+            <a:effectRef idx="0">
+              <a:schemeClr val="dk1"/>
+            </a:effectRef>
+            <a:fontRef idx="minor">
+              <a:schemeClr val="tx1"/>
+            </a:fontRef>
+          </p:style>
+        </p:cxnSp>
+        <p:sp>
+          <p:nvSpPr>
+            <p:cNvPr id="5" name="Rechteck 4"/>
+            <p:cNvSpPr/>
+            <p:nvPr/>
+          </p:nvSpPr>
+          <p:spPr>
+            <a:xfrm>
+              <a:off x="1146582" y="2761931"/>
+              <a:ext cx="2349500" cy="538480"/>
+            </a:xfrm>
+            <a:prstGeom prst="rect">
+              <a:avLst/>
+            </a:prstGeom>
+          </p:spPr>
+          <p:style>
+            <a:lnRef idx="2">
+              <a:schemeClr val="dk1"/>
+            </a:lnRef>
+            <a:fillRef idx="1">
+              <a:schemeClr val="lt1"/>
+            </a:fillRef>
+            <a:effectRef idx="0">
+              <a:schemeClr val="dk1"/>
+            </a:effectRef>
+            <a:fontRef idx="minor">
+              <a:schemeClr val="dk1"/>
+            </a:fontRef>
+          </p:style>
+          <p:txBody>
+            <a:bodyPr wrap="square" rtlCol="0" anchor="ctr">
+              <a:noAutofit/>
+            </a:bodyPr>
+            <a:lstStyle/>
+            <a:p>
+              <a:pPr algn="ctr">
+                <a:spcAft>
+                  <a:spcPts val="0"/>
+                </a:spcAft>
+              </a:pPr>
+              <a:r>
+                <a:rPr lang="de-CH" sz="1100" kern="1200" dirty="0" err="1" smtClean="0">
+                  <a:solidFill>
+                    <a:srgbClr val="FF0000"/>
+                  </a:solidFill>
+                  <a:effectLst/>
+                  <a:ea typeface="Times New Roman"/>
+                  <a:cs typeface="Times New Roman"/>
+                </a:rPr>
+                <a:t>move</a:t>
+              </a:r>
+              <a:r>
+                <a:rPr lang="de-CH" sz="1100" kern="1200" dirty="0" smtClean="0">
+                  <a:solidFill>
+                    <a:srgbClr val="FF0000"/>
+                  </a:solidFill>
+                  <a:effectLst/>
+                  <a:ea typeface="Times New Roman"/>
+                  <a:cs typeface="Times New Roman"/>
+                </a:rPr>
+                <a:t>()</a:t>
+              </a:r>
+              <a:endParaRPr lang="de-CH" sz="1200" dirty="0">
+                <a:solidFill>
+                  <a:srgbClr val="FF0000"/>
+                </a:solidFill>
+                <a:effectLst/>
+                <a:latin typeface="Times New Roman"/>
+                <a:ea typeface="Times New Roman"/>
+              </a:endParaRPr>
+            </a:p>
+          </p:txBody>
+        </p:sp>
+        <p:cxnSp>
+          <p:nvCxnSpPr>
+            <p:cNvPr id="9" name="Gewinkelte Verbindung 8"/>
+            <p:cNvCxnSpPr>
+              <a:stCxn id="4" idx="3"/>
+              <a:endCxn id="24" idx="0"/>
+            </p:cNvCxnSpPr>
+            <p:nvPr/>
+          </p:nvCxnSpPr>
+          <p:spPr>
+            <a:xfrm flipH="1">
+              <a:off x="3753892" y="2113596"/>
+              <a:ext cx="1066800" cy="1737675"/>
+            </a:xfrm>
+            <a:prstGeom prst="bentConnector4">
+              <a:avLst>
+                <a:gd name="adj1" fmla="val -21429"/>
+                <a:gd name="adj2" fmla="val 84259"/>
+              </a:avLst>
+            </a:prstGeom>
+            <a:ln w="28575">
+              <a:tailEnd type="arrow"/>
+            </a:ln>
+          </p:spPr>
+          <p:style>
+            <a:lnRef idx="1">
+              <a:schemeClr val="dk1"/>
+            </a:lnRef>
+            <a:fillRef idx="0">
+              <a:schemeClr val="dk1"/>
+            </a:fillRef>
+            <a:effectRef idx="0">
+              <a:schemeClr val="dk1"/>
+            </a:effectRef>
+            <a:fontRef idx="minor">
+              <a:schemeClr val="tx1"/>
+            </a:fontRef>
+          </p:style>
+        </p:cxnSp>
+        <p:sp>
+          <p:nvSpPr>
+            <p:cNvPr id="10" name="Textfeld 365"/>
+            <p:cNvSpPr txBox="1"/>
+            <p:nvPr/>
+          </p:nvSpPr>
+          <p:spPr>
+            <a:xfrm>
+              <a:off x="2334781" y="1856221"/>
+              <a:ext cx="477520" cy="276860"/>
+            </a:xfrm>
+            <a:prstGeom prst="rect">
+              <a:avLst/>
+            </a:prstGeom>
+            <a:noFill/>
+          </p:spPr>
+          <p:txBody>
+            <a:bodyPr wrap="square" rtlCol="0">
+              <a:noAutofit/>
+            </a:bodyPr>
+            <a:lstStyle/>
+            <a:p>
+              <a:pPr>
+                <a:lnSpc>
+                  <a:spcPct val="120000"/>
+                </a:lnSpc>
+                <a:spcAft>
+                  <a:spcPts val="0"/>
+                </a:spcAft>
+              </a:pPr>
+              <a:r>
+                <a:rPr lang="de-CH" sz="1100" kern="1200" dirty="0" err="1" smtClean="0">
+                  <a:solidFill>
+                    <a:srgbClr val="FF0000"/>
+                  </a:solidFill>
+                  <a:effectLst/>
+                  <a:latin typeface="Calibri"/>
+                  <a:ea typeface="Times New Roman"/>
+                  <a:cs typeface="Times New Roman"/>
+                </a:rPr>
+                <a:t>yes</a:t>
+              </a:r>
+              <a:endParaRPr lang="de-CH" sz="1100" dirty="0">
+                <a:solidFill>
+                  <a:srgbClr val="FF0000"/>
+                </a:solidFill>
+                <a:effectLst/>
+                <a:latin typeface="Calibri"/>
+                <a:ea typeface="Times New Roman"/>
+                <a:cs typeface="Times New Roman"/>
+              </a:endParaRPr>
+            </a:p>
+          </p:txBody>
+        </p:sp>
+        <p:cxnSp>
+          <p:nvCxnSpPr>
+            <p:cNvPr id="28" name="Gewinkelte Verbindung 27"/>
+            <p:cNvCxnSpPr>
+              <a:stCxn id="5" idx="2"/>
+              <a:endCxn id="24" idx="0"/>
+            </p:cNvCxnSpPr>
+            <p:nvPr/>
+          </p:nvCxnSpPr>
+          <p:spPr>
+            <a:xfrm rot="16200000" flipH="1">
+              <a:off x="2762182" y="2859561"/>
+              <a:ext cx="550860" cy="1432560"/>
+            </a:xfrm>
+            <a:prstGeom prst="bentConnector3">
+              <a:avLst>
+                <a:gd name="adj1" fmla="val 50000"/>
+              </a:avLst>
+            </a:prstGeom>
+            <a:ln w="28575">
+              <a:tailEnd type="arrow"/>
+            </a:ln>
+          </p:spPr>
+          <p:style>
+            <a:lnRef idx="1">
+              <a:schemeClr val="dk1"/>
+            </a:lnRef>
+            <a:fillRef idx="0">
+              <a:schemeClr val="dk1"/>
+            </a:fillRef>
+            <a:effectRef idx="0">
+              <a:schemeClr val="dk1"/>
+            </a:effectRef>
+            <a:fontRef idx="minor">
+              <a:schemeClr val="tx1"/>
+            </a:fontRef>
+          </p:style>
+        </p:cxnSp>
+        <p:sp>
+          <p:nvSpPr>
+            <p:cNvPr id="24" name="Abgerundetes Rechteck 23"/>
+            <p:cNvSpPr/>
+            <p:nvPr/>
+          </p:nvSpPr>
+          <p:spPr>
+            <a:xfrm>
+              <a:off x="3149372" y="3851271"/>
+              <a:ext cx="1209040" cy="391160"/>
+            </a:xfrm>
+            <a:prstGeom prst="roundRect">
+              <a:avLst>
+                <a:gd name="adj" fmla="val 45238"/>
+              </a:avLst>
+            </a:prstGeom>
+          </p:spPr>
+          <p:style>
+            <a:lnRef idx="2">
+              <a:schemeClr val="dk1"/>
+            </a:lnRef>
+            <a:fillRef idx="1">
+              <a:schemeClr val="lt1"/>
+            </a:fillRef>
+            <a:effectRef idx="0">
+              <a:schemeClr val="dk1"/>
+            </a:effectRef>
+            <a:fontRef idx="minor">
+              <a:schemeClr val="dk1"/>
+            </a:fontRef>
+          </p:style>
+          <p:txBody>
+            <a:bodyPr wrap="square" rtlCol="0" anchor="ctr">
+              <a:noAutofit/>
+            </a:bodyPr>
+            <a:lstStyle/>
+            <a:p>
+              <a:pPr algn="ctr">
+                <a:lnSpc>
+                  <a:spcPct val="120000"/>
+                </a:lnSpc>
+                <a:spcAft>
+                  <a:spcPts val="0"/>
+                </a:spcAft>
+              </a:pPr>
+              <a:r>
+                <a:rPr lang="de-CH" sz="1100" kern="1200" dirty="0" err="1" smtClean="0">
+                  <a:solidFill>
+                    <a:srgbClr val="FF0000"/>
+                  </a:solidFill>
+                  <a:effectLst/>
+                  <a:ea typeface="Times New Roman"/>
+                  <a:cs typeface="Times New Roman"/>
+                </a:rPr>
+                <a:t>act</a:t>
+              </a:r>
+              <a:r>
+                <a:rPr lang="de-CH" sz="1100" kern="1200" dirty="0" smtClean="0">
+                  <a:solidFill>
+                    <a:srgbClr val="FF0000"/>
+                  </a:solidFill>
+                  <a:effectLst/>
+                  <a:ea typeface="Times New Roman"/>
+                  <a:cs typeface="Times New Roman"/>
+                </a:rPr>
+                <a:t>()-End</a:t>
+              </a:r>
+              <a:endParaRPr lang="de-CH" sz="1100" dirty="0">
+                <a:solidFill>
+                  <a:srgbClr val="FF0000"/>
+                </a:solidFill>
+                <a:effectLst/>
+                <a:ea typeface="Times New Roman"/>
+                <a:cs typeface="Times New Roman"/>
+              </a:endParaRPr>
+            </a:p>
+          </p:txBody>
+        </p:sp>
+        <p:cxnSp>
+          <p:nvCxnSpPr>
+            <p:cNvPr id="13" name="Gewinkelte Verbindung 12"/>
+            <p:cNvCxnSpPr>
+              <a:stCxn id="24" idx="2"/>
+              <a:endCxn id="2" idx="0"/>
+            </p:cNvCxnSpPr>
+            <p:nvPr/>
+          </p:nvCxnSpPr>
+          <p:spPr>
+            <a:xfrm rot="5400000" flipH="1" flipV="1">
+              <a:off x="2195422" y="2683213"/>
+              <a:ext cx="3117687" cy="749"/>
+            </a:xfrm>
+            <a:prstGeom prst="bentConnector5">
+              <a:avLst>
+                <a:gd name="adj1" fmla="val -7332"/>
+                <a:gd name="adj2" fmla="val 257101469"/>
+                <a:gd name="adj3" fmla="val 107332"/>
+              </a:avLst>
+            </a:prstGeom>
+            <a:ln w="28575">
+              <a:prstDash val="sysDash"/>
+              <a:tailEnd type="arrow"/>
+            </a:ln>
+          </p:spPr>
+          <p:style>
+            <a:lnRef idx="1">
+              <a:schemeClr val="dk1"/>
+            </a:lnRef>
+            <a:fillRef idx="0">
+              <a:schemeClr val="dk1"/>
+            </a:fillRef>
+            <a:effectRef idx="0">
+              <a:schemeClr val="dk1"/>
+            </a:effectRef>
+            <a:fontRef idx="minor">
+              <a:schemeClr val="tx1"/>
+            </a:fontRef>
+          </p:style>
+        </p:cxnSp>
+        <p:sp>
+          <p:nvSpPr>
+            <p:cNvPr id="15" name="Textfeld 365"/>
+            <p:cNvSpPr txBox="1"/>
+            <p:nvPr/>
+          </p:nvSpPr>
+          <p:spPr>
+            <a:xfrm>
+              <a:off x="3923928" y="895072"/>
+              <a:ext cx="1767532" cy="334010"/>
+            </a:xfrm>
+            <a:prstGeom prst="rect">
+              <a:avLst/>
+            </a:prstGeom>
+            <a:noFill/>
+          </p:spPr>
+          <p:txBody>
+            <a:bodyPr wrap="square" rtlCol="0">
+              <a:noAutofit/>
+            </a:bodyPr>
+            <a:lstStyle/>
+            <a:p>
+              <a:pPr algn="r">
+                <a:spcAft>
+                  <a:spcPts val="0"/>
+                </a:spcAft>
+              </a:pPr>
+              <a:r>
+                <a:rPr lang="de-CH" sz="1200" i="1" kern="1200" dirty="0" smtClean="0">
+                  <a:solidFill>
+                    <a:srgbClr val="000000"/>
+                  </a:solidFill>
+                  <a:effectLst/>
+                  <a:latin typeface="Calibri"/>
+                  <a:ea typeface="Times New Roman"/>
+                  <a:cs typeface="Times New Roman"/>
+                </a:rPr>
+                <a:t>Run-Cycle</a:t>
+              </a:r>
+              <a:endParaRPr lang="de-CH" sz="1400" i="1" dirty="0">
+                <a:effectLst/>
+                <a:latin typeface="Times New Roman"/>
+                <a:ea typeface="Times New Roman"/>
+              </a:endParaRPr>
+            </a:p>
+          </p:txBody>
+        </p:sp>
+      </p:grpSp>
+    </p:spTree>
+    <p:extLst>
+      <p:ext uri="{BB962C8B-B14F-4D97-AF65-F5344CB8AC3E}">
+        <p14:creationId xmlns:p14="http://schemas.microsoft.com/office/powerpoint/2010/main" val="4260765557"/>
+      </p:ext>
+    </p:extLst>
+  </p:cSld>
+  <p:clrMapOvr>
+    <a:masterClrMapping/>
+  </p:clrMapOvr>
+</p:sld>
+</file>
+
+<file path=ppt/slides/slide5.xml><?xml version="1.0" encoding="utf-8"?>
 <p:sld xmlns:a="http://schemas.openxmlformats.org/drawingml/2006/main" xmlns:r="http://schemas.openxmlformats.org/officeDocument/2006/relationships" xmlns:p="http://schemas.openxmlformats.org/presentationml/2006/main">
   <p:cSld>
     <p:spTree>
@@ -6302,13 +7381,6 @@
                 </a:rPr>
                 <a:t>()</a:t>
               </a:r>
-              <a:endParaRPr lang="de-CH" sz="1100" dirty="0">
-                <a:solidFill>
-                  <a:srgbClr val="FF0000"/>
-                </a:solidFill>
-                <a:ea typeface="Times New Roman"/>
-                <a:cs typeface="Times New Roman"/>
-              </a:endParaRPr>
             </a:p>
           </p:txBody>
         </p:sp>
@@ -6408,13 +7480,6 @@
                 </a:rPr>
                 <a:t>()</a:t>
               </a:r>
-              <a:endParaRPr lang="de-CH" sz="1100" dirty="0">
-                <a:solidFill>
-                  <a:srgbClr val="FF0000"/>
-                </a:solidFill>
-                <a:ea typeface="Times New Roman"/>
-                <a:cs typeface="Times New Roman"/>
-              </a:endParaRPr>
             </a:p>
           </p:txBody>
         </p:sp>
@@ -6514,13 +7579,6 @@
                 </a:rPr>
                 <a:t>()</a:t>
               </a:r>
-              <a:endParaRPr lang="de-CH" sz="1100" dirty="0">
-                <a:solidFill>
-                  <a:srgbClr val="FF0000"/>
-                </a:solidFill>
-                <a:ea typeface="Times New Roman"/>
-                <a:cs typeface="Times New Roman"/>
-              </a:endParaRPr>
             </a:p>
           </p:txBody>
         </p:sp>
@@ -6620,13 +7678,6 @@
                 </a:rPr>
                 <a:t>()</a:t>
               </a:r>
-              <a:endParaRPr lang="de-CH" sz="1100" dirty="0">
-                <a:solidFill>
-                  <a:srgbClr val="FF0000"/>
-                </a:solidFill>
-                <a:ea typeface="Times New Roman"/>
-                <a:cs typeface="Times New Roman"/>
-              </a:endParaRPr>
             </a:p>
           </p:txBody>
         </p:sp>
@@ -6768,581 +7819,6 @@
     <p:extLst>
       <p:ext uri="{BB962C8B-B14F-4D97-AF65-F5344CB8AC3E}">
         <p14:creationId xmlns:p14="http://schemas.microsoft.com/office/powerpoint/2010/main" val="2864913708"/>
-      </p:ext>
-    </p:extLst>
-  </p:cSld>
-  <p:clrMapOvr>
-    <a:masterClrMapping/>
-  </p:clrMapOvr>
-</p:sld>
-</file>
-
-<file path=ppt/slides/slide5.xml><?xml version="1.0" encoding="utf-8"?>
-<p:sld xmlns:a="http://schemas.openxmlformats.org/drawingml/2006/main" xmlns:r="http://schemas.openxmlformats.org/officeDocument/2006/relationships" xmlns:p="http://schemas.openxmlformats.org/presentationml/2006/main">
-  <p:cSld>
-    <p:spTree>
-      <p:nvGrpSpPr>
-        <p:cNvPr id="1" name=""/>
-        <p:cNvGrpSpPr/>
-        <p:nvPr/>
-      </p:nvGrpSpPr>
-      <p:grpSpPr>
-        <a:xfrm>
-          <a:off x="0" y="0"/>
-          <a:ext cx="0" cy="0"/>
-          <a:chOff x="0" y="0"/>
-          <a:chExt cx="0" cy="0"/>
-        </a:xfrm>
-      </p:grpSpPr>
-      <p:grpSp>
-        <p:nvGrpSpPr>
-          <p:cNvPr id="14" name="Gruppieren 13"/>
-          <p:cNvGrpSpPr/>
-          <p:nvPr/>
-        </p:nvGrpSpPr>
-        <p:grpSpPr>
-          <a:xfrm>
-            <a:off x="1146582" y="1124744"/>
-            <a:ext cx="4122534" cy="3117687"/>
-            <a:chOff x="1146582" y="1124744"/>
-            <a:chExt cx="4122534" cy="3117687"/>
-          </a:xfrm>
-        </p:grpSpPr>
-        <p:sp>
-          <p:nvSpPr>
-            <p:cNvPr id="2" name="Abgerundetes Rechteck 1"/>
-            <p:cNvSpPr/>
-            <p:nvPr/>
-          </p:nvSpPr>
-          <p:spPr>
-            <a:xfrm>
-              <a:off x="3150121" y="1124744"/>
-              <a:ext cx="1209040" cy="391160"/>
-            </a:xfrm>
-            <a:prstGeom prst="roundRect">
-              <a:avLst>
-                <a:gd name="adj" fmla="val 45238"/>
-              </a:avLst>
-            </a:prstGeom>
-          </p:spPr>
-          <p:style>
-            <a:lnRef idx="2">
-              <a:schemeClr val="dk1"/>
-            </a:lnRef>
-            <a:fillRef idx="1">
-              <a:schemeClr val="lt1"/>
-            </a:fillRef>
-            <a:effectRef idx="0">
-              <a:schemeClr val="dk1"/>
-            </a:effectRef>
-            <a:fontRef idx="minor">
-              <a:schemeClr val="dk1"/>
-            </a:fontRef>
-          </p:style>
-          <p:txBody>
-            <a:bodyPr wrap="square" rtlCol="0" anchor="ctr">
-              <a:noAutofit/>
-            </a:bodyPr>
-            <a:lstStyle/>
-            <a:p>
-              <a:pPr algn="ctr">
-                <a:spcAft>
-                  <a:spcPts val="0"/>
-                </a:spcAft>
-              </a:pPr>
-              <a:r>
-                <a:rPr lang="de-CH" sz="1100" kern="1200">
-                  <a:solidFill>
-                    <a:srgbClr val="FF0000"/>
-                  </a:solidFill>
-                  <a:effectLst/>
-                  <a:ea typeface="Times New Roman"/>
-                  <a:cs typeface="Times New Roman"/>
-                </a:rPr>
-                <a:t>Start</a:t>
-              </a:r>
-              <a:endParaRPr lang="de-CH" sz="1200">
-                <a:solidFill>
-                  <a:srgbClr val="FF0000"/>
-                </a:solidFill>
-                <a:effectLst/>
-                <a:latin typeface="Times New Roman"/>
-                <a:ea typeface="Times New Roman"/>
-              </a:endParaRPr>
-            </a:p>
-          </p:txBody>
-        </p:sp>
-        <p:cxnSp>
-          <p:nvCxnSpPr>
-            <p:cNvPr id="3" name="Gerade Verbindung mit Pfeil 2"/>
-            <p:cNvCxnSpPr>
-              <a:stCxn id="2" idx="2"/>
-              <a:endCxn id="4" idx="0"/>
-            </p:cNvCxnSpPr>
-            <p:nvPr/>
-          </p:nvCxnSpPr>
-          <p:spPr>
-            <a:xfrm flipH="1">
-              <a:off x="3753892" y="1515904"/>
-              <a:ext cx="749" cy="270667"/>
-            </a:xfrm>
-            <a:prstGeom prst="straightConnector1">
-              <a:avLst/>
-            </a:prstGeom>
-            <a:ln w="28575">
-              <a:tailEnd type="arrow"/>
-            </a:ln>
-          </p:spPr>
-          <p:style>
-            <a:lnRef idx="1">
-              <a:schemeClr val="dk1"/>
-            </a:lnRef>
-            <a:fillRef idx="0">
-              <a:schemeClr val="dk1"/>
-            </a:fillRef>
-            <a:effectRef idx="0">
-              <a:schemeClr val="dk1"/>
-            </a:effectRef>
-            <a:fontRef idx="minor">
-              <a:schemeClr val="tx1"/>
-            </a:fontRef>
-          </p:style>
-        </p:cxnSp>
-        <p:sp>
-          <p:nvSpPr>
-            <p:cNvPr id="4" name="Flussdiagramm: Verzweigung 3"/>
-            <p:cNvSpPr/>
-            <p:nvPr/>
-          </p:nvSpPr>
-          <p:spPr>
-            <a:xfrm>
-              <a:off x="2687092" y="1786571"/>
-              <a:ext cx="2133600" cy="654050"/>
-            </a:xfrm>
-            <a:prstGeom prst="flowChartDecision">
-              <a:avLst/>
-            </a:prstGeom>
-          </p:spPr>
-          <p:style>
-            <a:lnRef idx="2">
-              <a:schemeClr val="dk1"/>
-            </a:lnRef>
-            <a:fillRef idx="1">
-              <a:schemeClr val="lt1"/>
-            </a:fillRef>
-            <a:effectRef idx="0">
-              <a:schemeClr val="dk1"/>
-            </a:effectRef>
-            <a:fontRef idx="minor">
-              <a:schemeClr val="dk1"/>
-            </a:fontRef>
-          </p:style>
-          <p:txBody>
-            <a:bodyPr wrap="square" lIns="0" tIns="0" rIns="0" bIns="0" rtlCol="0" anchor="ctr">
-              <a:noAutofit/>
-            </a:bodyPr>
-            <a:lstStyle/>
-            <a:p>
-              <a:pPr algn="ctr">
-                <a:spcAft>
-                  <a:spcPts val="0"/>
-                </a:spcAft>
-              </a:pPr>
-              <a:r>
-                <a:rPr lang="de-CH" sz="1100" kern="1200" dirty="0" err="1" smtClean="0">
-                  <a:solidFill>
-                    <a:srgbClr val="FF0000"/>
-                  </a:solidFill>
-                  <a:effectLst/>
-                  <a:ea typeface="Times New Roman"/>
-                  <a:cs typeface="Times New Roman"/>
-                </a:rPr>
-                <a:t>onLeaf</a:t>
-              </a:r>
-              <a:r>
-                <a:rPr lang="de-CH" sz="1100" kern="1200" dirty="0" smtClean="0">
-                  <a:solidFill>
-                    <a:srgbClr val="FF0000"/>
-                  </a:solidFill>
-                  <a:effectLst/>
-                  <a:ea typeface="Times New Roman"/>
-                  <a:cs typeface="Times New Roman"/>
-                </a:rPr>
-                <a:t>()</a:t>
-              </a:r>
-              <a:endParaRPr lang="de-CH" sz="1200" dirty="0">
-                <a:solidFill>
-                  <a:srgbClr val="FF0000"/>
-                </a:solidFill>
-                <a:effectLst/>
-                <a:latin typeface="Times New Roman"/>
-                <a:ea typeface="Times New Roman"/>
-              </a:endParaRPr>
-            </a:p>
-          </p:txBody>
-        </p:sp>
-        <p:sp>
-          <p:nvSpPr>
-            <p:cNvPr id="6" name="Textfeld 365"/>
-            <p:cNvSpPr txBox="1"/>
-            <p:nvPr/>
-          </p:nvSpPr>
-          <p:spPr>
-            <a:xfrm>
-              <a:off x="4791596" y="1851776"/>
-              <a:ext cx="477520" cy="276860"/>
-            </a:xfrm>
-            <a:prstGeom prst="rect">
-              <a:avLst/>
-            </a:prstGeom>
-            <a:noFill/>
-          </p:spPr>
-          <p:txBody>
-            <a:bodyPr wrap="square" rtlCol="0">
-              <a:noAutofit/>
-            </a:bodyPr>
-            <a:lstStyle/>
-            <a:p>
-              <a:pPr>
-                <a:spcAft>
-                  <a:spcPts val="0"/>
-                </a:spcAft>
-              </a:pPr>
-              <a:r>
-                <a:rPr lang="de-CH" sz="1100" kern="1200" dirty="0" err="1" smtClean="0">
-                  <a:solidFill>
-                    <a:srgbClr val="FF0000"/>
-                  </a:solidFill>
-                  <a:effectLst/>
-                  <a:latin typeface="Calibri"/>
-                  <a:ea typeface="Times New Roman"/>
-                  <a:cs typeface="Times New Roman"/>
-                </a:rPr>
-                <a:t>no</a:t>
-              </a:r>
-              <a:endParaRPr lang="de-CH" sz="1200" dirty="0">
-                <a:solidFill>
-                  <a:srgbClr val="FF0000"/>
-                </a:solidFill>
-                <a:effectLst/>
-                <a:latin typeface="Times New Roman"/>
-                <a:ea typeface="Times New Roman"/>
-              </a:endParaRPr>
-            </a:p>
-          </p:txBody>
-        </p:sp>
-        <p:cxnSp>
-          <p:nvCxnSpPr>
-            <p:cNvPr id="7" name="Gewinkelte Verbindung 6"/>
-            <p:cNvCxnSpPr>
-              <a:stCxn id="4" idx="1"/>
-              <a:endCxn id="5" idx="0"/>
-            </p:cNvCxnSpPr>
-            <p:nvPr/>
-          </p:nvCxnSpPr>
-          <p:spPr>
-            <a:xfrm rot="10800000" flipV="1">
-              <a:off x="2321332" y="2113595"/>
-              <a:ext cx="365760" cy="648335"/>
-            </a:xfrm>
-            <a:prstGeom prst="bentConnector2">
-              <a:avLst/>
-            </a:prstGeom>
-            <a:ln w="28575">
-              <a:tailEnd type="arrow"/>
-            </a:ln>
-          </p:spPr>
-          <p:style>
-            <a:lnRef idx="1">
-              <a:schemeClr val="dk1"/>
-            </a:lnRef>
-            <a:fillRef idx="0">
-              <a:schemeClr val="dk1"/>
-            </a:fillRef>
-            <a:effectRef idx="0">
-              <a:schemeClr val="dk1"/>
-            </a:effectRef>
-            <a:fontRef idx="minor">
-              <a:schemeClr val="tx1"/>
-            </a:fontRef>
-          </p:style>
-        </p:cxnSp>
-        <p:sp>
-          <p:nvSpPr>
-            <p:cNvPr id="5" name="Rechteck 4"/>
-            <p:cNvSpPr/>
-            <p:nvPr/>
-          </p:nvSpPr>
-          <p:spPr>
-            <a:xfrm>
-              <a:off x="1146582" y="2761931"/>
-              <a:ext cx="2349500" cy="538480"/>
-            </a:xfrm>
-            <a:prstGeom prst="rect">
-              <a:avLst/>
-            </a:prstGeom>
-          </p:spPr>
-          <p:style>
-            <a:lnRef idx="2">
-              <a:schemeClr val="dk1"/>
-            </a:lnRef>
-            <a:fillRef idx="1">
-              <a:schemeClr val="lt1"/>
-            </a:fillRef>
-            <a:effectRef idx="0">
-              <a:schemeClr val="dk1"/>
-            </a:effectRef>
-            <a:fontRef idx="minor">
-              <a:schemeClr val="dk1"/>
-            </a:fontRef>
-          </p:style>
-          <p:txBody>
-            <a:bodyPr wrap="square" rtlCol="0" anchor="ctr">
-              <a:noAutofit/>
-            </a:bodyPr>
-            <a:lstStyle/>
-            <a:p>
-              <a:pPr algn="ctr">
-                <a:spcAft>
-                  <a:spcPts val="0"/>
-                </a:spcAft>
-              </a:pPr>
-              <a:r>
-                <a:rPr lang="de-CH" sz="1100" kern="1200" dirty="0" err="1" smtClean="0">
-                  <a:solidFill>
-                    <a:srgbClr val="FF0000"/>
-                  </a:solidFill>
-                  <a:effectLst/>
-                  <a:ea typeface="Times New Roman"/>
-                  <a:cs typeface="Times New Roman"/>
-                </a:rPr>
-                <a:t>move</a:t>
-              </a:r>
-              <a:r>
-                <a:rPr lang="de-CH" sz="1100" kern="1200" dirty="0" smtClean="0">
-                  <a:solidFill>
-                    <a:srgbClr val="FF0000"/>
-                  </a:solidFill>
-                  <a:effectLst/>
-                  <a:ea typeface="Times New Roman"/>
-                  <a:cs typeface="Times New Roman"/>
-                </a:rPr>
-                <a:t>()</a:t>
-              </a:r>
-              <a:endParaRPr lang="de-CH" sz="1200" dirty="0">
-                <a:solidFill>
-                  <a:srgbClr val="FF0000"/>
-                </a:solidFill>
-                <a:effectLst/>
-                <a:latin typeface="Times New Roman"/>
-                <a:ea typeface="Times New Roman"/>
-              </a:endParaRPr>
-            </a:p>
-          </p:txBody>
-        </p:sp>
-        <p:cxnSp>
-          <p:nvCxnSpPr>
-            <p:cNvPr id="9" name="Gewinkelte Verbindung 8"/>
-            <p:cNvCxnSpPr>
-              <a:stCxn id="4" idx="3"/>
-              <a:endCxn id="24" idx="0"/>
-            </p:cNvCxnSpPr>
-            <p:nvPr/>
-          </p:nvCxnSpPr>
-          <p:spPr>
-            <a:xfrm flipH="1">
-              <a:off x="3753892" y="2113596"/>
-              <a:ext cx="1066800" cy="1737675"/>
-            </a:xfrm>
-            <a:prstGeom prst="bentConnector4">
-              <a:avLst>
-                <a:gd name="adj1" fmla="val -21429"/>
-                <a:gd name="adj2" fmla="val 84259"/>
-              </a:avLst>
-            </a:prstGeom>
-            <a:ln w="28575">
-              <a:tailEnd type="arrow"/>
-            </a:ln>
-          </p:spPr>
-          <p:style>
-            <a:lnRef idx="1">
-              <a:schemeClr val="dk1"/>
-            </a:lnRef>
-            <a:fillRef idx="0">
-              <a:schemeClr val="dk1"/>
-            </a:fillRef>
-            <a:effectRef idx="0">
-              <a:schemeClr val="dk1"/>
-            </a:effectRef>
-            <a:fontRef idx="minor">
-              <a:schemeClr val="tx1"/>
-            </a:fontRef>
-          </p:style>
-        </p:cxnSp>
-        <p:sp>
-          <p:nvSpPr>
-            <p:cNvPr id="10" name="Textfeld 365"/>
-            <p:cNvSpPr txBox="1"/>
-            <p:nvPr/>
-          </p:nvSpPr>
-          <p:spPr>
-            <a:xfrm>
-              <a:off x="2334781" y="1856221"/>
-              <a:ext cx="477520" cy="276860"/>
-            </a:xfrm>
-            <a:prstGeom prst="rect">
-              <a:avLst/>
-            </a:prstGeom>
-            <a:noFill/>
-          </p:spPr>
-          <p:txBody>
-            <a:bodyPr wrap="square" rtlCol="0">
-              <a:noAutofit/>
-            </a:bodyPr>
-            <a:lstStyle/>
-            <a:p>
-              <a:pPr>
-                <a:lnSpc>
-                  <a:spcPct val="120000"/>
-                </a:lnSpc>
-                <a:spcAft>
-                  <a:spcPts val="0"/>
-                </a:spcAft>
-              </a:pPr>
-              <a:r>
-                <a:rPr lang="de-CH" sz="1100" kern="1200" dirty="0" err="1" smtClean="0">
-                  <a:solidFill>
-                    <a:srgbClr val="FF0000"/>
-                  </a:solidFill>
-                  <a:effectLst/>
-                  <a:latin typeface="Calibri"/>
-                  <a:ea typeface="Times New Roman"/>
-                  <a:cs typeface="Times New Roman"/>
-                </a:rPr>
-                <a:t>yes</a:t>
-              </a:r>
-              <a:endParaRPr lang="de-CH" sz="1100" dirty="0">
-                <a:solidFill>
-                  <a:srgbClr val="FF0000"/>
-                </a:solidFill>
-                <a:effectLst/>
-                <a:latin typeface="Calibri"/>
-                <a:ea typeface="Times New Roman"/>
-                <a:cs typeface="Times New Roman"/>
-              </a:endParaRPr>
-            </a:p>
-          </p:txBody>
-        </p:sp>
-        <p:cxnSp>
-          <p:nvCxnSpPr>
-            <p:cNvPr id="28" name="Gewinkelte Verbindung 27"/>
-            <p:cNvCxnSpPr>
-              <a:stCxn id="5" idx="2"/>
-              <a:endCxn id="24" idx="0"/>
-            </p:cNvCxnSpPr>
-            <p:nvPr/>
-          </p:nvCxnSpPr>
-          <p:spPr>
-            <a:xfrm rot="16200000" flipH="1">
-              <a:off x="2762182" y="2859561"/>
-              <a:ext cx="550860" cy="1432560"/>
-            </a:xfrm>
-            <a:prstGeom prst="bentConnector3">
-              <a:avLst>
-                <a:gd name="adj1" fmla="val 50000"/>
-              </a:avLst>
-            </a:prstGeom>
-            <a:ln w="28575">
-              <a:tailEnd type="arrow"/>
-            </a:ln>
-          </p:spPr>
-          <p:style>
-            <a:lnRef idx="1">
-              <a:schemeClr val="dk1"/>
-            </a:lnRef>
-            <a:fillRef idx="0">
-              <a:schemeClr val="dk1"/>
-            </a:fillRef>
-            <a:effectRef idx="0">
-              <a:schemeClr val="dk1"/>
-            </a:effectRef>
-            <a:fontRef idx="minor">
-              <a:schemeClr val="tx1"/>
-            </a:fontRef>
-          </p:style>
-        </p:cxnSp>
-        <p:sp>
-          <p:nvSpPr>
-            <p:cNvPr id="24" name="Abgerundetes Rechteck 23"/>
-            <p:cNvSpPr/>
-            <p:nvPr/>
-          </p:nvSpPr>
-          <p:spPr>
-            <a:xfrm>
-              <a:off x="3149372" y="3851271"/>
-              <a:ext cx="1209040" cy="391160"/>
-            </a:xfrm>
-            <a:prstGeom prst="roundRect">
-              <a:avLst>
-                <a:gd name="adj" fmla="val 45238"/>
-              </a:avLst>
-            </a:prstGeom>
-          </p:spPr>
-          <p:style>
-            <a:lnRef idx="2">
-              <a:schemeClr val="dk1"/>
-            </a:lnRef>
-            <a:fillRef idx="1">
-              <a:schemeClr val="lt1"/>
-            </a:fillRef>
-            <a:effectRef idx="0">
-              <a:schemeClr val="dk1"/>
-            </a:effectRef>
-            <a:fontRef idx="minor">
-              <a:schemeClr val="dk1"/>
-            </a:fontRef>
-          </p:style>
-          <p:txBody>
-            <a:bodyPr wrap="square" rtlCol="0" anchor="ctr">
-              <a:noAutofit/>
-            </a:bodyPr>
-            <a:lstStyle/>
-            <a:p>
-              <a:pPr algn="ctr">
-                <a:lnSpc>
-                  <a:spcPct val="120000"/>
-                </a:lnSpc>
-                <a:spcAft>
-                  <a:spcPts val="0"/>
-                </a:spcAft>
-              </a:pPr>
-              <a:r>
-                <a:rPr lang="de-CH" sz="1100" kern="1200" dirty="0" err="1" smtClean="0">
-                  <a:solidFill>
-                    <a:srgbClr val="FF0000"/>
-                  </a:solidFill>
-                  <a:effectLst/>
-                  <a:ea typeface="Times New Roman"/>
-                  <a:cs typeface="Times New Roman"/>
-                </a:rPr>
-                <a:t>Stop</a:t>
-              </a:r>
-              <a:endParaRPr lang="de-CH" sz="1100" dirty="0">
-                <a:solidFill>
-                  <a:srgbClr val="FF0000"/>
-                </a:solidFill>
-                <a:effectLst/>
-                <a:ea typeface="Times New Roman"/>
-                <a:cs typeface="Times New Roman"/>
-              </a:endParaRPr>
-            </a:p>
-          </p:txBody>
-        </p:sp>
-      </p:grpSp>
-    </p:spTree>
-    <p:extLst>
-      <p:ext uri="{BB962C8B-B14F-4D97-AF65-F5344CB8AC3E}">
-        <p14:creationId xmlns:p14="http://schemas.microsoft.com/office/powerpoint/2010/main" val="4260765557"/>
       </p:ext>
     </p:extLst>
   </p:cSld>
@@ -7371,16 +7847,16 @@
       </p:grpSpPr>
       <p:grpSp>
         <p:nvGrpSpPr>
-          <p:cNvPr id="60" name="Gruppieren 59"/>
+          <p:cNvPr id="44" name="Gruppieren 43"/>
           <p:cNvGrpSpPr/>
           <p:nvPr/>
         </p:nvGrpSpPr>
         <p:grpSpPr>
           <a:xfrm>
-            <a:off x="535711" y="1106488"/>
-            <a:ext cx="6652782" cy="4387760"/>
-            <a:chOff x="535711" y="1106488"/>
-            <a:chExt cx="6652782" cy="4387760"/>
+            <a:off x="535711" y="895072"/>
+            <a:ext cx="6844601" cy="4599176"/>
+            <a:chOff x="535711" y="895072"/>
+            <a:chExt cx="6844601" cy="4599176"/>
           </a:xfrm>
         </p:grpSpPr>
         <p:sp>
@@ -7426,7 +7902,7 @@
                 </a:spcAft>
               </a:pPr>
               <a:r>
-                <a:rPr lang="de-CH" sz="1100" kern="1200">
+                <a:rPr lang="de-CH" sz="1100" kern="1200" dirty="0" err="1" smtClean="0">
                   <a:solidFill>
                     <a:srgbClr val="FF0000"/>
                   </a:solidFill>
@@ -7434,9 +7910,20 @@
                   <a:ea typeface="Times New Roman"/>
                   <a:cs typeface="Times New Roman"/>
                 </a:rPr>
-                <a:t>Start</a:t>
-              </a:r>
-              <a:endParaRPr lang="de-CH" sz="1200">
+                <a:t>act</a:t>
+              </a:r>
+              <a:r>
+                <a:rPr lang="de-CH" sz="1100" kern="1200" dirty="0" smtClean="0">
+                  <a:solidFill>
+                    <a:srgbClr val="FF0000"/>
+                  </a:solidFill>
+                  <a:effectLst/>
+                  <a:ea typeface="Times New Roman"/>
+                  <a:cs typeface="Times New Roman"/>
+                </a:rPr>
+                <a:t>()-Start</a:t>
+              </a:r>
+              <a:endParaRPr lang="de-CH" sz="1200" dirty="0">
                 <a:solidFill>
                   <a:srgbClr val="FF0000"/>
                 </a:solidFill>
@@ -7897,7 +8384,18 @@
                   <a:ea typeface="Times New Roman"/>
                   <a:cs typeface="Times New Roman"/>
                 </a:rPr>
-                <a:t>Stop</a:t>
+                <a:t>act</a:t>
+              </a:r>
+              <a:r>
+                <a:rPr lang="de-CH" sz="1100" kern="1200" dirty="0" smtClean="0">
+                  <a:solidFill>
+                    <a:srgbClr val="FF0000"/>
+                  </a:solidFill>
+                  <a:effectLst/>
+                  <a:ea typeface="Times New Roman"/>
+                  <a:cs typeface="Times New Roman"/>
+                </a:rPr>
+                <a:t>()-End</a:t>
               </a:r>
               <a:endParaRPr lang="de-CH" sz="1100" dirty="0">
                 <a:solidFill>
@@ -8490,6 +8988,93 @@
             </a:fontRef>
           </p:style>
         </p:cxnSp>
+        <p:cxnSp>
+          <p:nvCxnSpPr>
+            <p:cNvPr id="26" name="Gewinkelte Verbindung 25"/>
+            <p:cNvCxnSpPr>
+              <a:stCxn id="24" idx="3"/>
+              <a:endCxn id="2" idx="0"/>
+            </p:cNvCxnSpPr>
+            <p:nvPr/>
+          </p:nvCxnSpPr>
+          <p:spPr>
+            <a:xfrm flipH="1" flipV="1">
+              <a:off x="4581932" y="1106488"/>
+              <a:ext cx="604521" cy="4192180"/>
+            </a:xfrm>
+            <a:prstGeom prst="bentConnector4">
+              <a:avLst>
+                <a:gd name="adj1" fmla="val -356139"/>
+                <a:gd name="adj2" fmla="val 105453"/>
+              </a:avLst>
+            </a:prstGeom>
+            <a:ln w="28575">
+              <a:prstDash val="sysDash"/>
+              <a:tailEnd type="arrow"/>
+            </a:ln>
+          </p:spPr>
+          <p:style>
+            <a:lnRef idx="1">
+              <a:schemeClr val="dk1"/>
+            </a:lnRef>
+            <a:fillRef idx="0">
+              <a:schemeClr val="dk1"/>
+            </a:fillRef>
+            <a:effectRef idx="0">
+              <a:schemeClr val="dk1"/>
+            </a:effectRef>
+            <a:fontRef idx="minor">
+              <a:schemeClr val="tx1"/>
+            </a:fontRef>
+          </p:style>
+        </p:cxnSp>
+        <p:sp>
+          <p:nvSpPr>
+            <p:cNvPr id="28" name="Textfeld 365"/>
+            <p:cNvSpPr txBox="1"/>
+            <p:nvPr/>
+          </p:nvSpPr>
+          <p:spPr>
+            <a:xfrm>
+              <a:off x="5612780" y="895072"/>
+              <a:ext cx="1767532" cy="334010"/>
+            </a:xfrm>
+            <a:prstGeom prst="rect">
+              <a:avLst/>
+            </a:prstGeom>
+            <a:noFill/>
+          </p:spPr>
+          <p:txBody>
+            <a:bodyPr wrap="square" rtlCol="0">
+              <a:noAutofit/>
+            </a:bodyPr>
+            <a:lstStyle/>
+            <a:p>
+              <a:pPr algn="r">
+                <a:spcAft>
+                  <a:spcPts val="0"/>
+                </a:spcAft>
+              </a:pPr>
+              <a:r>
+                <a:rPr lang="de-CH" sz="1200" i="1" kern="1200" dirty="0" smtClean="0">
+                  <a:solidFill>
+                    <a:srgbClr val="000000"/>
+                  </a:solidFill>
+                  <a:effectLst/>
+                  <a:latin typeface="Calibri"/>
+                  <a:ea typeface="Times New Roman"/>
+                  <a:cs typeface="Times New Roman"/>
+                </a:rPr>
+                <a:t>Run-Cycle</a:t>
+              </a:r>
+              <a:endParaRPr lang="de-CH" sz="1400" i="1" dirty="0">
+                <a:effectLst/>
+                <a:latin typeface="Times New Roman"/>
+                <a:ea typeface="Times New Roman"/>
+              </a:endParaRPr>
+            </a:p>
+          </p:txBody>
+        </p:sp>
       </p:grpSp>
     </p:spTree>
     <p:extLst>
@@ -8523,7 +9108,7 @@
       </p:grpSpPr>
       <p:grpSp>
         <p:nvGrpSpPr>
-          <p:cNvPr id="23" name="Gruppieren 22"/>
+          <p:cNvPr id="18" name="Gruppieren 17"/>
           <p:cNvGrpSpPr/>
           <p:nvPr/>
         </p:nvGrpSpPr>
@@ -8578,7 +9163,7 @@
                 </a:spcAft>
               </a:pPr>
               <a:r>
-                <a:rPr lang="de-CH" sz="1100" kern="1200">
+                <a:rPr lang="de-CH" sz="1100" kern="1200" dirty="0" err="1" smtClean="0">
                   <a:solidFill>
                     <a:schemeClr val="tx1"/>
                   </a:solidFill>
@@ -8586,9 +9171,20 @@
                   <a:ea typeface="Times New Roman"/>
                   <a:cs typeface="Times New Roman"/>
                 </a:rPr>
-                <a:t>Start</a:t>
-              </a:r>
-              <a:endParaRPr lang="de-CH" sz="1200">
+                <a:t>act</a:t>
+              </a:r>
+              <a:r>
+                <a:rPr lang="de-CH" sz="1100" kern="1200" dirty="0" smtClean="0">
+                  <a:solidFill>
+                    <a:schemeClr val="tx1"/>
+                  </a:solidFill>
+                  <a:effectLst/>
+                  <a:ea typeface="Times New Roman"/>
+                  <a:cs typeface="Times New Roman"/>
+                </a:rPr>
+                <a:t>()-Start</a:t>
+              </a:r>
+              <a:endParaRPr lang="de-CH" sz="1200" dirty="0">
                 <a:solidFill>
                   <a:schemeClr val="tx1"/>
                 </a:solidFill>
@@ -9021,7 +9617,18 @@
                   <a:ea typeface="Times New Roman"/>
                   <a:cs typeface="Times New Roman"/>
                 </a:rPr>
-                <a:t>Stop</a:t>
+                <a:t>act</a:t>
+              </a:r>
+              <a:r>
+                <a:rPr lang="de-CH" sz="1100" kern="1200" dirty="0" smtClean="0">
+                  <a:solidFill>
+                    <a:schemeClr val="tx1"/>
+                  </a:solidFill>
+                  <a:effectLst/>
+                  <a:ea typeface="Times New Roman"/>
+                  <a:cs typeface="Times New Roman"/>
+                </a:rPr>
+                <a:t>()-End</a:t>
               </a:r>
               <a:endParaRPr lang="de-CH" sz="1100" dirty="0">
                 <a:solidFill>

</xml_diff>